<commit_message>
Small update of the slides
</commit_message>
<xml_diff>
--- a/Thrive in chaos(chaos engineering).pptx
+++ b/Thrive in chaos(chaos engineering).pptx
@@ -308,7 +308,7 @@
           <a:p>
             <a:fld id="{61980CE6-365B-4D68-BCEB-386B210004E0}" type="datetimeFigureOut">
               <a:rPr lang="en-NL" smtClean="0"/>
-              <a:t>06/08/2025</a:t>
+              <a:t>07/08/2025</a:t>
             </a:fld>
             <a:endParaRPr lang="en-NL"/>
           </a:p>
@@ -1179,7 +1179,7 @@
           <a:p>
             <a:fld id="{55DAE4B6-489B-4B4B-AE8A-A27769488260}" type="datetimeFigureOut">
               <a:rPr lang="en-NL" smtClean="0"/>
-              <a:t>06/08/2025</a:t>
+              <a:t>07/08/2025</a:t>
             </a:fld>
             <a:endParaRPr lang="en-NL"/>
           </a:p>
@@ -1528,7 +1528,7 @@
           <a:p>
             <a:fld id="{55DAE4B6-489B-4B4B-AE8A-A27769488260}" type="datetimeFigureOut">
               <a:rPr lang="en-NL" smtClean="0"/>
-              <a:t>06/08/2025</a:t>
+              <a:t>07/08/2025</a:t>
             </a:fld>
             <a:endParaRPr lang="en-NL"/>
           </a:p>
@@ -1857,7 +1857,7 @@
           <a:p>
             <a:fld id="{55DAE4B6-489B-4B4B-AE8A-A27769488260}" type="datetimeFigureOut">
               <a:rPr lang="en-NL" smtClean="0"/>
-              <a:t>06/08/2025</a:t>
+              <a:t>07/08/2025</a:t>
             </a:fld>
             <a:endParaRPr lang="en-NL"/>
           </a:p>
@@ -2093,7 +2093,7 @@
           <a:p>
             <a:fld id="{55DAE4B6-489B-4B4B-AE8A-A27769488260}" type="datetimeFigureOut">
               <a:rPr lang="en-NL" smtClean="0"/>
-              <a:t>06/08/2025</a:t>
+              <a:t>07/08/2025</a:t>
             </a:fld>
             <a:endParaRPr lang="en-NL"/>
           </a:p>
@@ -2339,7 +2339,7 @@
           <a:p>
             <a:fld id="{55DAE4B6-489B-4B4B-AE8A-A27769488260}" type="datetimeFigureOut">
               <a:rPr lang="en-NL" smtClean="0"/>
-              <a:t>06/08/2025</a:t>
+              <a:t>07/08/2025</a:t>
             </a:fld>
             <a:endParaRPr lang="en-NL"/>
           </a:p>
@@ -3714,7 +3714,7 @@
           <a:p>
             <a:fld id="{55DAE4B6-489B-4B4B-AE8A-A27769488260}" type="datetimeFigureOut">
               <a:rPr lang="en-NL" smtClean="0"/>
-              <a:t>06/08/2025</a:t>
+              <a:t>07/08/2025</a:t>
             </a:fld>
             <a:endParaRPr lang="en-NL"/>
           </a:p>
@@ -4062,7 +4062,7 @@
           <a:p>
             <a:fld id="{55DAE4B6-489B-4B4B-AE8A-A27769488260}" type="datetimeFigureOut">
               <a:rPr lang="en-NL" smtClean="0"/>
-              <a:t>06/08/2025</a:t>
+              <a:t>07/08/2025</a:t>
             </a:fld>
             <a:endParaRPr lang="en-NL"/>
           </a:p>
@@ -4366,7 +4366,7 @@
           <a:p>
             <a:fld id="{55DAE4B6-489B-4B4B-AE8A-A27769488260}" type="datetimeFigureOut">
               <a:rPr lang="en-NL" smtClean="0"/>
-              <a:t>06/08/2025</a:t>
+              <a:t>07/08/2025</a:t>
             </a:fld>
             <a:endParaRPr lang="en-NL"/>
           </a:p>
@@ -4817,7 +4817,7 @@
           <a:p>
             <a:fld id="{55DAE4B6-489B-4B4B-AE8A-A27769488260}" type="datetimeFigureOut">
               <a:rPr lang="en-NL" smtClean="0"/>
-              <a:t>06/08/2025</a:t>
+              <a:t>07/08/2025</a:t>
             </a:fld>
             <a:endParaRPr lang="en-NL"/>
           </a:p>
@@ -4995,7 +4995,7 @@
           <a:p>
             <a:fld id="{55DAE4B6-489B-4B4B-AE8A-A27769488260}" type="datetimeFigureOut">
               <a:rPr lang="en-NL" smtClean="0"/>
-              <a:t>06/08/2025</a:t>
+              <a:t>07/08/2025</a:t>
             </a:fld>
             <a:endParaRPr lang="en-NL"/>
           </a:p>
@@ -5144,7 +5144,7 @@
           <a:p>
             <a:fld id="{55DAE4B6-489B-4B4B-AE8A-A27769488260}" type="datetimeFigureOut">
               <a:rPr lang="en-NL" smtClean="0"/>
-              <a:t>06/08/2025</a:t>
+              <a:t>07/08/2025</a:t>
             </a:fld>
             <a:endParaRPr lang="en-NL"/>
           </a:p>
@@ -5460,7 +5460,7 @@
           <a:p>
             <a:fld id="{55DAE4B6-489B-4B4B-AE8A-A27769488260}" type="datetimeFigureOut">
               <a:rPr lang="en-NL" smtClean="0"/>
-              <a:t>06/08/2025</a:t>
+              <a:t>07/08/2025</a:t>
             </a:fld>
             <a:endParaRPr lang="en-NL"/>
           </a:p>
@@ -10568,7 +10568,7 @@
           <a:p>
             <a:r>
               <a:rPr lang="en-GB" dirty="0"/>
-              <a:t>Sadly, not all everything is supported</a:t>
+              <a:t>Sadly, not all resources are supported</a:t>
             </a:r>
             <a:endParaRPr lang="en-NL" dirty="0"/>
           </a:p>
@@ -10878,7 +10878,7 @@
 </file>
 
 <file path=ppt/slides/slide22.xml><?xml version="1.0" encoding="utf-8"?>
-<p:sld xmlns:a="http://schemas.openxmlformats.org/drawingml/2006/main" xmlns:r="http://schemas.openxmlformats.org/officeDocument/2006/relationships" xmlns:p="http://schemas.openxmlformats.org/presentationml/2006/main" show="0">
+<p:sld xmlns:a="http://schemas.openxmlformats.org/drawingml/2006/main" xmlns:r="http://schemas.openxmlformats.org/officeDocument/2006/relationships" xmlns:p="http://schemas.openxmlformats.org/presentationml/2006/main">
   <p:cSld>
     <p:spTree>
       <p:nvGrpSpPr>
@@ -14084,6 +14084,15 @@
 </file>
 
 <file path=customXml/item1.xml><?xml version="1.0" encoding="utf-8"?>
+<?mso-contentType ?>
+<FormTemplates xmlns="http://schemas.microsoft.com/sharepoint/v3/contenttype/forms">
+  <Display>DocumentLibraryForm</Display>
+  <Edit>DocumentLibraryForm</Edit>
+  <New>DocumentLibraryForm</New>
+</FormTemplates>
+</file>
+
+<file path=customXml/item2.xml><?xml version="1.0" encoding="utf-8"?>
 <ct:contentTypeSchema xmlns:ct="http://schemas.microsoft.com/office/2006/metadata/contentType" xmlns:ma="http://schemas.microsoft.com/office/2006/metadata/properties/metaAttributes" ct:_="" ma:_="" ma:contentTypeName="KH Document" ma:contentTypeID="0x010100BE884009E1AF4E4AA68748A5339F4A5900DDA8CE9F2A9C024DB7BC804F36BEE7A4" ma:contentTypeVersion="18" ma:contentTypeDescription="KH documenten" ma:contentTypeScope="" ma:versionID="986a195a4634d695f0b40839312c0288">
   <xsd:schema xmlns:xsd="http://www.w3.org/2001/XMLSchema" xmlns:xs="http://www.w3.org/2001/XMLSchema" xmlns:p="http://schemas.microsoft.com/office/2006/metadata/properties" xmlns:ns2="6bed5341-ebe3-454f-909f-36f044ec18c5" xmlns:ns3="4fa33c19-156f-4d53-8a37-f6529061f5c4" targetNamespace="http://schemas.microsoft.com/office/2006/metadata/properties" ma:root="true" ma:fieldsID="ad1e26d4e881e252e9d83dd1bdded4c5" ns2:_="" ns3:_="">
     <xsd:import namespace="6bed5341-ebe3-454f-909f-36f044ec18c5"/>
@@ -14338,15 +14347,6 @@
 </ct:contentTypeSchema>
 </file>
 
-<file path=customXml/item2.xml><?xml version="1.0" encoding="utf-8"?>
-<?mso-contentType ?>
-<FormTemplates xmlns="http://schemas.microsoft.com/sharepoint/v3/contenttype/forms">
-  <Display>DocumentLibraryForm</Display>
-  <Edit>DocumentLibraryForm</Edit>
-  <New>DocumentLibraryForm</New>
-</FormTemplates>
-</file>
-
 <file path=customXml/item3.xml><?xml version="1.0" encoding="utf-8"?>
 <p:properties xmlns:p="http://schemas.microsoft.com/office/2006/metadata/properties" xmlns:xsi="http://www.w3.org/2001/XMLSchema-instance" xmlns:pc="http://schemas.microsoft.com/office/infopath/2007/PartnerControls">
   <documentManagement>
@@ -14372,6 +14372,14 @@
 </file>
 
 <file path=customXml/itemProps1.xml><?xml version="1.0" encoding="utf-8"?>
+<ds:datastoreItem xmlns:ds="http://schemas.openxmlformats.org/officeDocument/2006/customXml" ds:itemID="{34E658E8-DC51-4603-95C7-04C745FD648B}">
+  <ds:schemaRefs>
+    <ds:schemaRef ds:uri="http://schemas.microsoft.com/sharepoint/v3/contenttype/forms"/>
+  </ds:schemaRefs>
+</ds:datastoreItem>
+</file>
+
+<file path=customXml/itemProps2.xml><?xml version="1.0" encoding="utf-8"?>
 <ds:datastoreItem xmlns:ds="http://schemas.openxmlformats.org/officeDocument/2006/customXml" ds:itemID="{9C91CF35-00ED-4990-B96C-9A3DE23EF5FD}">
   <ds:schemaRefs>
     <ds:schemaRef ds:uri="http://schemas.microsoft.com/office/2006/metadata/contentType"/>
@@ -14390,14 +14398,6 @@
 </ds:datastoreItem>
 </file>
 
-<file path=customXml/itemProps2.xml><?xml version="1.0" encoding="utf-8"?>
-<ds:datastoreItem xmlns:ds="http://schemas.openxmlformats.org/officeDocument/2006/customXml" ds:itemID="{34E658E8-DC51-4603-95C7-04C745FD648B}">
-  <ds:schemaRefs>
-    <ds:schemaRef ds:uri="http://schemas.microsoft.com/sharepoint/v3/contenttype/forms"/>
-  </ds:schemaRefs>
-</ds:datastoreItem>
-</file>
-
 <file path=customXml/itemProps3.xml><?xml version="1.0" encoding="utf-8"?>
 <ds:datastoreItem xmlns:ds="http://schemas.openxmlformats.org/officeDocument/2006/customXml" ds:itemID="{1B038F9C-4D7E-47F7-9EBC-5343D692C4A8}">
   <ds:schemaRefs>

</xml_diff>

<commit_message>
Slides change 'pizzasessie' to 'thaise curry sessie'
</commit_message>
<xml_diff>
--- a/Thrive in chaos(chaos engineering).pptx
+++ b/Thrive in chaos(chaos engineering).pptx
@@ -6013,8 +6013,20 @@
           <a:lstStyle/>
           <a:p>
             <a:r>
+              <a:rPr lang="en-GB" dirty="0"/>
+              <a:t>T</a:t>
+            </a:r>
+            <a:r>
+              <a:rPr lang="en-GB"/>
+              <a:t>haise</a:t>
+            </a:r>
+            <a:r>
+              <a:rPr lang="en-GB" dirty="0"/>
+              <a:t> curry </a:t>
+            </a:r>
+            <a:r>
               <a:rPr lang="en-GB" dirty="0" err="1"/>
-              <a:t>Pizzasessie</a:t>
+              <a:t>sessie</a:t>
             </a:r>
             <a:endParaRPr lang="en-NL" dirty="0"/>
           </a:p>
@@ -14084,15 +14096,6 @@
 </file>
 
 <file path=customXml/item1.xml><?xml version="1.0" encoding="utf-8"?>
-<?mso-contentType ?>
-<FormTemplates xmlns="http://schemas.microsoft.com/sharepoint/v3/contenttype/forms">
-  <Display>DocumentLibraryForm</Display>
-  <Edit>DocumentLibraryForm</Edit>
-  <New>DocumentLibraryForm</New>
-</FormTemplates>
-</file>
-
-<file path=customXml/item2.xml><?xml version="1.0" encoding="utf-8"?>
 <ct:contentTypeSchema xmlns:ct="http://schemas.microsoft.com/office/2006/metadata/contentType" xmlns:ma="http://schemas.microsoft.com/office/2006/metadata/properties/metaAttributes" ct:_="" ma:_="" ma:contentTypeName="KH Document" ma:contentTypeID="0x010100BE884009E1AF4E4AA68748A5339F4A5900DDA8CE9F2A9C024DB7BC804F36BEE7A4" ma:contentTypeVersion="18" ma:contentTypeDescription="KH documenten" ma:contentTypeScope="" ma:versionID="986a195a4634d695f0b40839312c0288">
   <xsd:schema xmlns:xsd="http://www.w3.org/2001/XMLSchema" xmlns:xs="http://www.w3.org/2001/XMLSchema" xmlns:p="http://schemas.microsoft.com/office/2006/metadata/properties" xmlns:ns2="6bed5341-ebe3-454f-909f-36f044ec18c5" xmlns:ns3="4fa33c19-156f-4d53-8a37-f6529061f5c4" targetNamespace="http://schemas.microsoft.com/office/2006/metadata/properties" ma:root="true" ma:fieldsID="ad1e26d4e881e252e9d83dd1bdded4c5" ns2:_="" ns3:_="">
     <xsd:import namespace="6bed5341-ebe3-454f-909f-36f044ec18c5"/>
@@ -14347,6 +14350,15 @@
 </ct:contentTypeSchema>
 </file>
 
+<file path=customXml/item2.xml><?xml version="1.0" encoding="utf-8"?>
+<?mso-contentType ?>
+<FormTemplates xmlns="http://schemas.microsoft.com/sharepoint/v3/contenttype/forms">
+  <Display>DocumentLibraryForm</Display>
+  <Edit>DocumentLibraryForm</Edit>
+  <New>DocumentLibraryForm</New>
+</FormTemplates>
+</file>
+
 <file path=customXml/item3.xml><?xml version="1.0" encoding="utf-8"?>
 <p:properties xmlns:p="http://schemas.microsoft.com/office/2006/metadata/properties" xmlns:xsi="http://www.w3.org/2001/XMLSchema-instance" xmlns:pc="http://schemas.microsoft.com/office/infopath/2007/PartnerControls">
   <documentManagement>
@@ -14372,14 +14384,6 @@
 </file>
 
 <file path=customXml/itemProps1.xml><?xml version="1.0" encoding="utf-8"?>
-<ds:datastoreItem xmlns:ds="http://schemas.openxmlformats.org/officeDocument/2006/customXml" ds:itemID="{34E658E8-DC51-4603-95C7-04C745FD648B}">
-  <ds:schemaRefs>
-    <ds:schemaRef ds:uri="http://schemas.microsoft.com/sharepoint/v3/contenttype/forms"/>
-  </ds:schemaRefs>
-</ds:datastoreItem>
-</file>
-
-<file path=customXml/itemProps2.xml><?xml version="1.0" encoding="utf-8"?>
 <ds:datastoreItem xmlns:ds="http://schemas.openxmlformats.org/officeDocument/2006/customXml" ds:itemID="{9C91CF35-00ED-4990-B96C-9A3DE23EF5FD}">
   <ds:schemaRefs>
     <ds:schemaRef ds:uri="http://schemas.microsoft.com/office/2006/metadata/contentType"/>
@@ -14398,6 +14402,14 @@
 </ds:datastoreItem>
 </file>
 
+<file path=customXml/itemProps2.xml><?xml version="1.0" encoding="utf-8"?>
+<ds:datastoreItem xmlns:ds="http://schemas.openxmlformats.org/officeDocument/2006/customXml" ds:itemID="{34E658E8-DC51-4603-95C7-04C745FD648B}">
+  <ds:schemaRefs>
+    <ds:schemaRef ds:uri="http://schemas.microsoft.com/sharepoint/v3/contenttype/forms"/>
+  </ds:schemaRefs>
+</ds:datastoreItem>
+</file>
+
 <file path=customXml/itemProps3.xml><?xml version="1.0" encoding="utf-8"?>
 <ds:datastoreItem xmlns:ds="http://schemas.openxmlformats.org/officeDocument/2006/customXml" ds:itemID="{1B038F9C-4D7E-47F7-9EBC-5343D692C4A8}">
   <ds:schemaRefs>

</xml_diff>